<commit_message>
add button ti send image
</commit_message>
<xml_diff>
--- a/ResQPal.pptx
+++ b/ResQPal.pptx
@@ -8971,7 +8971,7 @@
           <a:p>
             <a:fld id="{5B6E5515-95EC-472D-9C2F-79A8A91C6AA5}" type="datetimeFigureOut">
               <a:rPr lang="he-IL" smtClean="0"/>
-              <a:t>ט'/סיון/תשפ"ה</a:t>
+              <a:t>י"ב/סיון/תשפ"ה</a:t>
             </a:fld>
             <a:endParaRPr lang="he-IL"/>
           </a:p>
@@ -9567,7 +9567,28 @@
           <a:p>
             <a:r>
               <a:rPr lang="he-IL" dirty="0"/>
-              <a:t>"הילד נפל, קיבל מכה חזקה בראש ועכשיו הוא מקיא ולא מגיב"</a:t>
+              <a:t>"הילד נפל, קיבל מכה חזקה בראש ועכשיו הוא מקיא ולא </a:t>
+            </a:r>
+            <a:r>
+              <a:rPr lang="he-IL"/>
+              <a:t>מגיב"</a:t>
+            </a:r>
+          </a:p>
+          <a:p>
+            <a:endParaRPr lang="he-IL" dirty="0"/>
+          </a:p>
+          <a:p>
+            <a:r>
+              <a:rPr lang="he-IL" dirty="0"/>
+              <a:t>רשתות עצביות עם אי-ליניאריות מסוגלות ללמוד ולייצג קשרים </a:t>
+            </a:r>
+            <a:r>
+              <a:rPr lang="he-IL" b="1" dirty="0"/>
+              <a:t>מורכבים ולא ליניאריים</a:t>
+            </a:r>
+            <a:r>
+              <a:rPr lang="he-IL" dirty="0"/>
+              <a:t> בין קלטים לפלטים. </a:t>
             </a:r>
           </a:p>
           <a:p>
@@ -9597,6 +9618,16 @@
             <a:r>
               <a:rPr lang="he-IL" dirty="0"/>
               <a:t> שראה עד עכשיו.</a:t>
+            </a:r>
+          </a:p>
+          <a:p>
+            <a:r>
+              <a:rPr lang="he-IL" dirty="0" err="1"/>
+              <a:t>גרדיאנט</a:t>
+            </a:r>
+            <a:r>
+              <a:rPr lang="he-IL" dirty="0"/>
+              <a:t> נעלם</a:t>
             </a:r>
           </a:p>
           <a:p>
@@ -9989,7 +10020,7 @@
           <a:p>
             <a:fld id="{774A27FE-EA11-4EDB-8F1F-B62C19952F4C}" type="datetimeFigureOut">
               <a:rPr lang="he-IL" smtClean="0"/>
-              <a:t>ט'/סיון/תשפ"ה</a:t>
+              <a:t>י"ב/סיון/תשפ"ה</a:t>
             </a:fld>
             <a:endParaRPr lang="he-IL"/>
           </a:p>
@@ -10187,7 +10218,7 @@
           <a:p>
             <a:fld id="{774A27FE-EA11-4EDB-8F1F-B62C19952F4C}" type="datetimeFigureOut">
               <a:rPr lang="he-IL" smtClean="0"/>
-              <a:t>ט'/סיון/תשפ"ה</a:t>
+              <a:t>י"ב/סיון/תשפ"ה</a:t>
             </a:fld>
             <a:endParaRPr lang="he-IL"/>
           </a:p>
@@ -10395,7 +10426,7 @@
           <a:p>
             <a:fld id="{774A27FE-EA11-4EDB-8F1F-B62C19952F4C}" type="datetimeFigureOut">
               <a:rPr lang="he-IL" smtClean="0"/>
-              <a:t>ט'/סיון/תשפ"ה</a:t>
+              <a:t>י"ב/סיון/תשפ"ה</a:t>
             </a:fld>
             <a:endParaRPr lang="he-IL"/>
           </a:p>
@@ -10593,7 +10624,7 @@
           <a:p>
             <a:fld id="{774A27FE-EA11-4EDB-8F1F-B62C19952F4C}" type="datetimeFigureOut">
               <a:rPr lang="he-IL" smtClean="0"/>
-              <a:t>ט'/סיון/תשפ"ה</a:t>
+              <a:t>י"ב/סיון/תשפ"ה</a:t>
             </a:fld>
             <a:endParaRPr lang="he-IL"/>
           </a:p>
@@ -10868,7 +10899,7 @@
           <a:p>
             <a:fld id="{774A27FE-EA11-4EDB-8F1F-B62C19952F4C}" type="datetimeFigureOut">
               <a:rPr lang="he-IL" smtClean="0"/>
-              <a:t>ט'/סיון/תשפ"ה</a:t>
+              <a:t>י"ב/סיון/תשפ"ה</a:t>
             </a:fld>
             <a:endParaRPr lang="he-IL"/>
           </a:p>
@@ -11133,7 +11164,7 @@
           <a:p>
             <a:fld id="{774A27FE-EA11-4EDB-8F1F-B62C19952F4C}" type="datetimeFigureOut">
               <a:rPr lang="he-IL" smtClean="0"/>
-              <a:t>ט'/סיון/תשפ"ה</a:t>
+              <a:t>י"ב/סיון/תשפ"ה</a:t>
             </a:fld>
             <a:endParaRPr lang="he-IL"/>
           </a:p>
@@ -11545,7 +11576,7 @@
           <a:p>
             <a:fld id="{774A27FE-EA11-4EDB-8F1F-B62C19952F4C}" type="datetimeFigureOut">
               <a:rPr lang="he-IL" smtClean="0"/>
-              <a:t>ט'/סיון/תשפ"ה</a:t>
+              <a:t>י"ב/סיון/תשפ"ה</a:t>
             </a:fld>
             <a:endParaRPr lang="he-IL"/>
           </a:p>
@@ -11686,7 +11717,7 @@
           <a:p>
             <a:fld id="{774A27FE-EA11-4EDB-8F1F-B62C19952F4C}" type="datetimeFigureOut">
               <a:rPr lang="he-IL" smtClean="0"/>
-              <a:t>ט'/סיון/תשפ"ה</a:t>
+              <a:t>י"ב/סיון/תשפ"ה</a:t>
             </a:fld>
             <a:endParaRPr lang="he-IL"/>
           </a:p>
@@ -11799,7 +11830,7 @@
           <a:p>
             <a:fld id="{774A27FE-EA11-4EDB-8F1F-B62C19952F4C}" type="datetimeFigureOut">
               <a:rPr lang="he-IL" smtClean="0"/>
-              <a:t>ט'/סיון/תשפ"ה</a:t>
+              <a:t>י"ב/סיון/תשפ"ה</a:t>
             </a:fld>
             <a:endParaRPr lang="he-IL"/>
           </a:p>
@@ -12110,7 +12141,7 @@
           <a:p>
             <a:fld id="{774A27FE-EA11-4EDB-8F1F-B62C19952F4C}" type="datetimeFigureOut">
               <a:rPr lang="he-IL" smtClean="0"/>
-              <a:t>ט'/סיון/תשפ"ה</a:t>
+              <a:t>י"ב/סיון/תשפ"ה</a:t>
             </a:fld>
             <a:endParaRPr lang="he-IL"/>
           </a:p>
@@ -12398,7 +12429,7 @@
           <a:p>
             <a:fld id="{774A27FE-EA11-4EDB-8F1F-B62C19952F4C}" type="datetimeFigureOut">
               <a:rPr lang="he-IL" smtClean="0"/>
-              <a:t>ט'/סיון/תשפ"ה</a:t>
+              <a:t>י"ב/סיון/תשפ"ה</a:t>
             </a:fld>
             <a:endParaRPr lang="he-IL"/>
           </a:p>
@@ -12639,7 +12670,7 @@
           <a:p>
             <a:fld id="{774A27FE-EA11-4EDB-8F1F-B62C19952F4C}" type="datetimeFigureOut">
               <a:rPr lang="he-IL" smtClean="0"/>
-              <a:t>ט'/סיון/תשפ"ה</a:t>
+              <a:t>י"ב/סיון/תשפ"ה</a:t>
             </a:fld>
             <a:endParaRPr lang="he-IL"/>
           </a:p>
@@ -13926,8 +13957,47 @@
         </p:blipFill>
         <p:spPr>
           <a:xfrm>
-            <a:off x="1018592" y="1027906"/>
-            <a:ext cx="5077408" cy="4633230"/>
+            <a:off x="675725" y="490645"/>
+            <a:ext cx="3056425" cy="2789045"/>
+          </a:xfrm>
+          <a:prstGeom prst="rect">
+            <a:avLst/>
+          </a:prstGeom>
+        </p:spPr>
+      </p:pic>
+      <p:pic>
+        <p:nvPicPr>
+          <p:cNvPr id="5" name="תמונה 4">
+            <a:extLst>
+              <a:ext uri="{FF2B5EF4-FFF2-40B4-BE49-F238E27FC236}">
+                <a16:creationId xmlns:a16="http://schemas.microsoft.com/office/drawing/2014/main" id="{9100DAA5-8F18-D61B-47D9-D3A982EB79F1}"/>
+              </a:ext>
+            </a:extLst>
+          </p:cNvPr>
+          <p:cNvPicPr>
+            <a:picLocks noChangeAspect="1"/>
+          </p:cNvPicPr>
+          <p:nvPr/>
+        </p:nvPicPr>
+        <p:blipFill>
+          <a:blip r:embed="rId4">
+            <a:duotone>
+              <a:schemeClr val="accent4">
+                <a:shade val="45000"/>
+                <a:satMod val="135000"/>
+              </a:schemeClr>
+              <a:prstClr val="white"/>
+            </a:duotone>
+          </a:blip>
+          <a:srcRect l="8185" t="7601" r="11884" b="3546"/>
+          <a:stretch>
+            <a:fillRect/>
+          </a:stretch>
+        </p:blipFill>
+        <p:spPr>
+          <a:xfrm>
+            <a:off x="4366882" y="2868460"/>
+            <a:ext cx="6731180" cy="3419606"/>
           </a:xfrm>
           <a:prstGeom prst="rect">
             <a:avLst/>

</xml_diff>

<commit_message>
add notes to the pp
</commit_message>
<xml_diff>
--- a/ResQPal.pptx
+++ b/ResQPal.pptx
@@ -8971,7 +8971,7 @@
           <a:p>
             <a:fld id="{5B6E5515-95EC-472D-9C2F-79A8A91C6AA5}" type="datetimeFigureOut">
               <a:rPr lang="he-IL" smtClean="0"/>
-              <a:t>י"ב/סיון/תשפ"ה</a:t>
+              <a:t>י"ד/סיון/תשפ"ה</a:t>
             </a:fld>
             <a:endParaRPr lang="he-IL"/>
           </a:p>
@@ -9283,6 +9283,19 @@
           <a:lstStyle/>
           <a:p>
             <a:r>
+              <a:rPr lang="he-IL" dirty="0" err="1"/>
+              <a:t>סוביקטיבי</a:t>
+            </a:r>
+            <a:r>
+              <a:rPr lang="he-IL" dirty="0"/>
+              <a:t> מתוך המילים להבין מילת מפתח. הבנת הכוונה</a:t>
+            </a:r>
+          </a:p>
+          <a:p>
+            <a:endParaRPr lang="he-IL" dirty="0"/>
+          </a:p>
+          <a:p>
+            <a:r>
               <a:rPr lang="he-IL" dirty="0"/>
               <a:t>טקסט 1:</a:t>
             </a:r>
@@ -9309,12 +9322,18 @@
             </a:r>
           </a:p>
           <a:p>
+            <a:r>
+              <a:rPr lang="he-IL" dirty="0"/>
+              <a:t>ככה המח מגיב</a:t>
+            </a:r>
+          </a:p>
+          <a:p>
             <a:endParaRPr lang="he-IL" dirty="0"/>
           </a:p>
           <a:p>
             <a:r>
               <a:rPr lang="he-IL" dirty="0"/>
-              <a:t>לא מתאים כי זה לשפה חופשית. אחרת זה לא פותר אך בעיה</a:t>
+              <a:t>לא מתאים כי זה לשפה חופשית. לא לרופאים. אחרת זה לא פותר אך בעיה</a:t>
             </a:r>
           </a:p>
         </p:txBody>
@@ -9399,54 +9418,6 @@
           <a:bodyPr/>
           <a:lstStyle/>
           <a:p>
-            <a:r>
-              <a:rPr lang="en-US" dirty="0"/>
-              <a:t>TF IDF</a:t>
-            </a:r>
-            <a:r>
-              <a:rPr lang="he-IL" dirty="0"/>
-              <a:t> שכלול ל </a:t>
-            </a:r>
-            <a:r>
-              <a:rPr lang="en-US" dirty="0" err="1"/>
-              <a:t>BoW</a:t>
-            </a:r>
-            <a:r>
-              <a:rPr lang="he-IL" dirty="0"/>
-              <a:t>. </a:t>
-            </a:r>
-            <a:r>
-              <a:rPr lang="he-IL" dirty="0" err="1"/>
-              <a:t>מסויף</a:t>
-            </a:r>
-            <a:r>
-              <a:rPr lang="he-IL" dirty="0"/>
-              <a:t> שכבת חשיבות שמתבססת על שכיחות, כמה המילה נדירה</a:t>
-            </a:r>
-          </a:p>
-          <a:p>
-            <a:pPr marL="0" indent="0">
-              <a:buNone/>
-            </a:pPr>
-            <a:endParaRPr lang="he-IL" b="0" dirty="0"/>
-          </a:p>
-          <a:p>
-            <a:pPr marL="0" indent="0">
-              <a:buNone/>
-            </a:pPr>
-            <a:r>
-              <a:rPr lang="he-IL" b="1" dirty="0"/>
-              <a:t>1. "הוא בהכרה, לא מתלונן על כאבים."</a:t>
-            </a:r>
-            <a:br>
-              <a:rPr lang="he-IL" dirty="0"/>
-            </a:br>
-            <a:r>
-              <a:rPr lang="he-IL" b="1" dirty="0"/>
-              <a:t>2. "הוא לא בהכרה, מתלונן על כאבים."</a:t>
-            </a:r>
-          </a:p>
-          <a:p>
             <a:pPr marL="0" indent="0">
               <a:buNone/>
             </a:pPr>
@@ -9454,9 +9425,51 @@
           </a:p>
           <a:p>
             <a:r>
+              <a:rPr lang="en-US" b="1" dirty="0" err="1"/>
+              <a:t>BoW</a:t>
+            </a:r>
+            <a:r>
+              <a:rPr lang="en-US" b="1" dirty="0"/>
+              <a:t>:</a:t>
+            </a:r>
+            <a:r>
+              <a:rPr lang="en-US" dirty="0"/>
+              <a:t> </a:t>
+            </a:r>
+            <a:r>
               <a:rPr lang="he-IL" dirty="0"/>
-              <a:t>"מרגיש לא" ו"לא מרגיש" ייתנו כמעט את אותו וקטור, כי המילים עצמן קיימות. </a:t>
-            </a:r>
+              <a:t>אם המילה "כוויות" מופיעה 10 פעמים במסמך על כוויות, והמילה "ו-" מופיעה 10 פעמים גם היא, שתיהן יקבלו את אותו ציון. </a:t>
+            </a:r>
+            <a:r>
+              <a:rPr lang="en-US" b="1" dirty="0"/>
+              <a:t>TF-IDF:</a:t>
+            </a:r>
+            <a:r>
+              <a:rPr lang="en-US" dirty="0"/>
+              <a:t> </a:t>
+            </a:r>
+            <a:r>
+              <a:rPr lang="he-IL" dirty="0"/>
+              <a:t>המילה "כוויות" תקבל ציון </a:t>
+            </a:r>
+            <a:r>
+              <a:rPr lang="en-US" dirty="0"/>
+              <a:t>TF-IDF </a:t>
+            </a:r>
+            <a:r>
+              <a:rPr lang="he-IL" dirty="0"/>
+              <a:t>גבוה (כי היא ספציפית לנושא), בעוד המילה "ו-" תקבל ציון </a:t>
+            </a:r>
+            <a:r>
+              <a:rPr lang="en-US" dirty="0"/>
+              <a:t>TF-IDF </a:t>
+            </a:r>
+            <a:r>
+              <a:rPr lang="he-IL" dirty="0"/>
+              <a:t>נמוך מאוד (כי היא מופיעה כמעט בכל מסמך ולא ייחודית).</a:t>
+            </a:r>
+          </a:p>
+          <a:p>
             <a:r>
               <a:rPr lang="he-IL" b="1" dirty="0"/>
               <a:t>הוא לא יבין את השלילה כשינוי מהותי:</a:t>
@@ -9471,6 +9484,16 @@
               <a:rPr lang="he-IL" dirty="0"/>
               <a:t>מתעלם מסדר, משמעות סמנטית וממשמעות השלילה</a:t>
             </a:r>
+          </a:p>
+          <a:p>
+            <a:r>
+              <a:rPr lang="he-IL" b="1" dirty="0"/>
+              <a:t>"לא טוב" = "טוב" + "לא".</a:t>
+            </a:r>
+            <a:r>
+              <a:rPr lang="he-IL" dirty="0"/>
+              <a:t> </a:t>
+            </a:r>
             <a:endParaRPr lang="he-IL" b="1" dirty="0"/>
           </a:p>
           <a:p>
@@ -9481,6 +9504,15 @@
               <a:rPr lang="he-IL" dirty="0" err="1"/>
               <a:t>אמבדינג</a:t>
             </a:r>
+            <a:endParaRPr lang="he-IL" dirty="0"/>
+          </a:p>
+          <a:p>
+            <a:r>
+              <a:rPr lang="he-IL" dirty="0"/>
+              <a:t>בעיית הקשרים</a:t>
+            </a:r>
+          </a:p>
+          <a:p>
             <a:endParaRPr lang="he-IL" dirty="0"/>
           </a:p>
         </p:txBody>
@@ -9567,11 +9599,35 @@
           <a:p>
             <a:r>
               <a:rPr lang="he-IL" dirty="0"/>
-              <a:t>"הילד נפל, קיבל מכה חזקה בראש ועכשיו הוא מקיא ולא </a:t>
+              <a:t>יש משימות שקלות לבני </a:t>
             </a:r>
             <a:r>
               <a:rPr lang="he-IL"/>
-              <a:t>מגיב"</a:t>
+              <a:t>אדם ולא למחשבים</a:t>
+            </a:r>
+          </a:p>
+          <a:p>
+            <a:r>
+              <a:rPr lang="he-IL" dirty="0"/>
+              <a:t>משפט קירוב אוניברסלי</a:t>
+            </a:r>
+          </a:p>
+          <a:p>
+            <a:r>
+              <a:rPr lang="he-IL" dirty="0"/>
+              <a:t>אי לינאריות</a:t>
+            </a:r>
+          </a:p>
+          <a:p>
+            <a:r>
+              <a:rPr lang="he-IL" dirty="0"/>
+              <a:t>לבדוק מה זה פותר הבדל בין לינארי </a:t>
+            </a:r>
+          </a:p>
+          <a:p>
+            <a:r>
+              <a:rPr lang="he-IL" dirty="0"/>
+              <a:t>"הילד נפל, קיבל מכה חזקה בראש ועכשיו הוא מקיא ולא מגיב"   להביא משפט אחר</a:t>
             </a:r>
           </a:p>
           <a:p>
@@ -9592,15 +9648,70 @@
             </a:r>
           </a:p>
           <a:p>
+            <a:r>
+              <a:rPr lang="he-IL" dirty="0"/>
+              <a:t>בין כל שכבה ליניארית (הסכום המשוקלל), מופעלת פונקציית הפעלה אי-ליניארית.</a:t>
+            </a:r>
+          </a:p>
+          <a:p>
             <a:endParaRPr lang="he-IL" dirty="0"/>
           </a:p>
           <a:p>
+            <a:r>
+              <a:rPr lang="he-IL" dirty="0"/>
+              <a:t>הנגזרת של </a:t>
+            </a:r>
+            <a:r>
+              <a:rPr lang="en-US" dirty="0"/>
+              <a:t>ReLU </a:t>
+            </a:r>
+            <a:r>
+              <a:rPr lang="he-IL" dirty="0"/>
+              <a:t>היא 1 עבור ערכים חיוביים. זה אומר </a:t>
+            </a:r>
+            <a:r>
+              <a:rPr lang="he-IL" dirty="0" err="1"/>
+              <a:t>שהגרדיאנטים</a:t>
+            </a:r>
+            <a:r>
+              <a:rPr lang="he-IL" dirty="0"/>
+              <a:t> "זורמים" דרך </a:t>
+            </a:r>
+            <a:r>
+              <a:rPr lang="he-IL" dirty="0" err="1"/>
+              <a:t>נוירוני</a:t>
+            </a:r>
             <a:r>
               <a:rPr lang="he-IL" dirty="0"/>
               <a:t> </a:t>
             </a:r>
             <a:r>
               <a:rPr lang="en-US" dirty="0"/>
+              <a:t>ReLU </a:t>
+            </a:r>
+            <a:r>
+              <a:rPr lang="he-IL" dirty="0"/>
+              <a:t>פעילים </a:t>
+            </a:r>
+            <a:r>
+              <a:rPr lang="he-IL" b="1" dirty="0"/>
+              <a:t>בלי להיחלש</a:t>
+            </a:r>
+            <a:r>
+              <a:rPr lang="he-IL" dirty="0"/>
+              <a:t>, ומאפשר למידה יעילה בכל השכבות, גם העמוקות.</a:t>
+            </a:r>
+          </a:p>
+          <a:p>
+            <a:endParaRPr lang="he-IL" dirty="0"/>
+          </a:p>
+          <a:p>
+            <a:r>
+              <a:rPr lang="he-IL" dirty="0"/>
+              <a:t> </a:t>
+            </a:r>
+            <a:r>
+              <a:rPr lang="en-US" dirty="0"/>
               <a:t>RNN </a:t>
             </a:r>
             <a:r>
@@ -9628,6 +9739,16 @@
             <a:r>
               <a:rPr lang="he-IL" dirty="0"/>
               <a:t> נעלם</a:t>
+            </a:r>
+          </a:p>
+          <a:p>
+            <a:r>
+              <a:rPr lang="he-IL" dirty="0" err="1"/>
+              <a:t>גרדיאנט</a:t>
+            </a:r>
+            <a:r>
+              <a:rPr lang="he-IL" dirty="0"/>
+              <a:t> שיפוע בנקודה</a:t>
             </a:r>
           </a:p>
           <a:p>
@@ -9864,6 +9985,304 @@
     <p:extLst>
       <p:ext uri="{BB962C8B-B14F-4D97-AF65-F5344CB8AC3E}">
         <p14:creationId xmlns:p14="http://schemas.microsoft.com/office/powerpoint/2010/main" val="2620023492"/>
+      </p:ext>
+    </p:extLst>
+  </p:cSld>
+  <p:clrMapOvr>
+    <a:masterClrMapping/>
+  </p:clrMapOvr>
+</p:notes>
+</file>
+
+<file path=ppt/notesSlides/notesSlide5.xml><?xml version="1.0" encoding="utf-8"?>
+<p:notes xmlns:a="http://schemas.openxmlformats.org/drawingml/2006/main" xmlns:r="http://schemas.openxmlformats.org/officeDocument/2006/relationships" xmlns:p="http://schemas.openxmlformats.org/presentationml/2006/main">
+  <p:cSld>
+    <p:spTree>
+      <p:nvGrpSpPr>
+        <p:cNvPr id="1" name=""/>
+        <p:cNvGrpSpPr/>
+        <p:nvPr/>
+      </p:nvGrpSpPr>
+      <p:grpSpPr>
+        <a:xfrm>
+          <a:off x="0" y="0"/>
+          <a:ext cx="0" cy="0"/>
+          <a:chOff x="0" y="0"/>
+          <a:chExt cx="0" cy="0"/>
+        </a:xfrm>
+      </p:grpSpPr>
+      <p:sp>
+        <p:nvSpPr>
+          <p:cNvPr id="2" name="מציין מיקום של תמונת שקופית 1"/>
+          <p:cNvSpPr>
+            <a:spLocks noGrp="1" noRot="1" noChangeAspect="1"/>
+          </p:cNvSpPr>
+          <p:nvPr>
+            <p:ph type="sldImg"/>
+          </p:nvPr>
+        </p:nvSpPr>
+        <p:spPr/>
+      </p:sp>
+      <p:sp>
+        <p:nvSpPr>
+          <p:cNvPr id="3" name="מציין מיקום של הערות 2"/>
+          <p:cNvSpPr>
+            <a:spLocks noGrp="1"/>
+          </p:cNvSpPr>
+          <p:nvPr>
+            <p:ph type="body" idx="1"/>
+          </p:nvPr>
+        </p:nvSpPr>
+        <p:spPr/>
+        <p:txBody>
+          <a:bodyPr/>
+          <a:lstStyle/>
+          <a:p>
+            <a:r>
+              <a:rPr lang="he-IL" dirty="0"/>
+              <a:t>למידת מאפיינים:</a:t>
+            </a:r>
+          </a:p>
+          <a:p>
+            <a:r>
+              <a:rPr lang="he-IL" dirty="0"/>
+              <a:t>מטריצה כפול 3</a:t>
+            </a:r>
+          </a:p>
+          <a:p>
+            <a:r>
+              <a:rPr lang="he-IL" dirty="0"/>
+              <a:t>פילטרים עבור תכונות הכפלה</a:t>
+            </a:r>
+          </a:p>
+          <a:p>
+            <a:r>
+              <a:rPr lang="he-IL" dirty="0"/>
+              <a:t>הפחתת ממדים ליעילות ושינויים במיקום</a:t>
+            </a:r>
+          </a:p>
+          <a:p>
+            <a:r>
+              <a:rPr lang="he-IL" dirty="0"/>
+              <a:t>בחירת </a:t>
+            </a:r>
+            <a:r>
+              <a:rPr lang="en-US" dirty="0"/>
+              <a:t>MAX POOLING</a:t>
+            </a:r>
+            <a:r>
+              <a:rPr lang="he-IL" dirty="0"/>
+              <a:t> </a:t>
+            </a:r>
+            <a:r>
+              <a:rPr lang="he-IL" dirty="0" err="1"/>
+              <a:t>מהמפת</a:t>
+            </a:r>
+            <a:r>
+              <a:rPr lang="he-IL" dirty="0"/>
+              <a:t> מאפיינים</a:t>
+            </a:r>
+          </a:p>
+          <a:p>
+            <a:endParaRPr lang="he-IL" dirty="0"/>
+          </a:p>
+          <a:p>
+            <a:r>
+              <a:rPr lang="en-US" b="1" dirty="0"/>
+              <a:t>ReLU:</a:t>
+            </a:r>
+            <a:r>
+              <a:rPr lang="en-US" dirty="0"/>
+              <a:t> </a:t>
+            </a:r>
+            <a:r>
+              <a:rPr lang="he-IL" dirty="0"/>
+              <a:t>מיד לאחר פעולת </a:t>
+            </a:r>
+            <a:r>
+              <a:rPr lang="he-IL" dirty="0" err="1"/>
+              <a:t>הקונבולוציה</a:t>
+            </a:r>
+            <a:r>
+              <a:rPr lang="he-IL" dirty="0"/>
+              <a:t>, מופעלת פונקציית </a:t>
+            </a:r>
+            <a:r>
+              <a:rPr lang="en-US" dirty="0"/>
+              <a:t>ReLU (</a:t>
+            </a:r>
+            <a:r>
+              <a:rPr lang="he-IL" dirty="0"/>
+              <a:t>או פונקציית הפעלה אי-ליניארית אחרת) על כל ערך במפות המאפיינים שנוצרו. </a:t>
+            </a:r>
+            <a:r>
+              <a:rPr lang="he-IL" b="1" dirty="0"/>
+              <a:t>בדוגמת הכוויה:</a:t>
+            </a:r>
+            <a:r>
+              <a:rPr lang="he-IL" dirty="0"/>
+              <a:t> נניח שפילטר מסוים מזהה "אדמומיות בוהקת" ומפיק ערך גבוה באזורים כאלה, וערך נמוך (אולי שלילי) באזורים אחרים. כאשר </a:t>
+            </a:r>
+            <a:r>
+              <a:rPr lang="en-US" dirty="0"/>
+              <a:t>ReLU </a:t>
+            </a:r>
+            <a:r>
+              <a:rPr lang="he-IL" dirty="0"/>
+              <a:t>מופעלת, היא "תכבה" את האזורים עם הערכים השליליים (כי הם לא "אדמומיות בוהקת") ותשאיר את האזורים החיוביים.</a:t>
+            </a:r>
+          </a:p>
+          <a:p>
+            <a:r>
+              <a:rPr lang="he-IL" dirty="0"/>
+              <a:t>בכל שכבה, פונקציית הפעלה מאפשרת לרשת ללמוד דפוסים אי-ליניאריים. השכבות הראשונות לומדות מאפיינים ליניאריים פשוטים כמו קווים, אבל ברגע שמפעילים </a:t>
+            </a:r>
+            <a:r>
+              <a:rPr lang="en-US" dirty="0"/>
+              <a:t>ReLU, </a:t>
+            </a:r>
+            <a:r>
+              <a:rPr lang="he-IL" dirty="0"/>
+              <a:t>השכבה הבאה יכולה ללמוד שילובים לא-ליניאריים של הקווים האלה (לדוגמה, פינות, או צורות ספציפיות).</a:t>
+            </a:r>
+          </a:p>
+          <a:p>
+            <a:endParaRPr lang="he-IL" dirty="0"/>
+          </a:p>
+          <a:p>
+            <a:endParaRPr lang="he-IL" dirty="0"/>
+          </a:p>
+          <a:p>
+            <a:r>
+              <a:rPr lang="he-IL" dirty="0"/>
+              <a:t>סיווג:</a:t>
+            </a:r>
+          </a:p>
+          <a:p>
+            <a:r>
+              <a:rPr lang="he-IL" dirty="0"/>
+              <a:t>השטחה בשביל השכבה הבאה</a:t>
+            </a:r>
+          </a:p>
+          <a:p>
+            <a:r>
+              <a:rPr lang="en-US" dirty="0"/>
+              <a:t>FC</a:t>
+            </a:r>
+            <a:endParaRPr lang="he-IL" dirty="0"/>
+          </a:p>
+          <a:p>
+            <a:r>
+              <a:rPr lang="he-IL" dirty="0"/>
+              <a:t>אם יש נוירון בשכבת ה-</a:t>
+            </a:r>
+            <a:r>
+              <a:rPr lang="en-US" dirty="0"/>
+              <a:t>FC </a:t>
+            </a:r>
+            <a:r>
+              <a:rPr lang="he-IL" dirty="0"/>
+              <a:t>שאחראי לזהות "שלפוחיות" ונוירון אחר שאחראי לזהות "אדמומיות עזה", בשכבת ה-</a:t>
+            </a:r>
+            <a:r>
+              <a:rPr lang="en-US" dirty="0"/>
+              <a:t>FC </a:t>
+            </a:r>
+            <a:r>
+              <a:rPr lang="he-IL" dirty="0"/>
+              <a:t>הבאה יהיה נוירון שיקבל קלט משניהם וישלב את המידע כדי להחליט: "אם יש שלפוחיות </a:t>
+            </a:r>
+            <a:r>
+              <a:rPr lang="he-IL" i="1" dirty="0"/>
+              <a:t>וגם</a:t>
+            </a:r>
+            <a:r>
+              <a:rPr lang="he-IL" dirty="0"/>
+              <a:t> אדמומיות עזה, אז כנראה שזו כוויה מדרגה 2". המשקולות של החיבורים הללו יתחזקו בהתאם.</a:t>
+            </a:r>
+          </a:p>
+          <a:p>
+            <a:endParaRPr lang="he-IL" dirty="0"/>
+          </a:p>
+          <a:p>
+            <a:r>
+              <a:rPr lang="he-IL" dirty="0"/>
+              <a:t>פלט</a:t>
+            </a:r>
+          </a:p>
+          <a:p>
+            <a:r>
+              <a:rPr lang="he-IL" dirty="0" err="1"/>
+              <a:t>סיגמואיד</a:t>
+            </a:r>
+            <a:r>
+              <a:rPr lang="he-IL" dirty="0"/>
+              <a:t> לסיווג בינארי עבור כל דרגה</a:t>
+            </a:r>
+          </a:p>
+          <a:p>
+            <a:endParaRPr lang="he-IL" dirty="0"/>
+          </a:p>
+          <a:p>
+            <a:r>
+              <a:rPr lang="en-US" dirty="0"/>
+              <a:t>EfficientNet-B1</a:t>
+            </a:r>
+            <a:r>
+              <a:rPr lang="he-IL" dirty="0"/>
+              <a:t> חוסך למידת </a:t>
+            </a:r>
+            <a:r>
+              <a:rPr lang="he-IL" dirty="0" err="1"/>
+              <a:t>מאפינים</a:t>
+            </a:r>
+            <a:r>
+              <a:rPr lang="he-IL" dirty="0"/>
+              <a:t> בסיסים כמו קווים וצורות </a:t>
+            </a:r>
+          </a:p>
+          <a:p>
+            <a:r>
+              <a:rPr lang="en-US" dirty="0"/>
+              <a:t>Fine-tuning</a:t>
+            </a:r>
+            <a:r>
+              <a:rPr lang="he-IL" dirty="0"/>
+              <a:t> – כוונון עדין, מורידים את הפלט, מוסיפים שכבות צפופות ושכבת פלט אישית</a:t>
+            </a:r>
+          </a:p>
+          <a:p>
+            <a:endParaRPr lang="he-IL" dirty="0"/>
+          </a:p>
+        </p:txBody>
+      </p:sp>
+      <p:sp>
+        <p:nvSpPr>
+          <p:cNvPr id="4" name="מציין מיקום של מספר שקופית 3"/>
+          <p:cNvSpPr>
+            <a:spLocks noGrp="1"/>
+          </p:cNvSpPr>
+          <p:nvPr>
+            <p:ph type="sldNum" sz="quarter" idx="5"/>
+          </p:nvPr>
+        </p:nvSpPr>
+        <p:spPr/>
+        <p:txBody>
+          <a:bodyPr/>
+          <a:lstStyle/>
+          <a:p>
+            <a:fld id="{B82D04FC-5618-4B1F-BBAC-CE6D6D1A7AF8}" type="slidenum">
+              <a:rPr lang="he-IL" smtClean="0"/>
+              <a:t>7</a:t>
+            </a:fld>
+            <a:endParaRPr lang="he-IL"/>
+          </a:p>
+        </p:txBody>
+      </p:sp>
+    </p:spTree>
+    <p:extLst>
+      <p:ext uri="{BB962C8B-B14F-4D97-AF65-F5344CB8AC3E}">
+        <p14:creationId xmlns:p14="http://schemas.microsoft.com/office/powerpoint/2010/main" val="1525183185"/>
       </p:ext>
     </p:extLst>
   </p:cSld>
@@ -10020,7 +10439,7 @@
           <a:p>
             <a:fld id="{774A27FE-EA11-4EDB-8F1F-B62C19952F4C}" type="datetimeFigureOut">
               <a:rPr lang="he-IL" smtClean="0"/>
-              <a:t>י"ב/סיון/תשפ"ה</a:t>
+              <a:t>י"ד/סיון/תשפ"ה</a:t>
             </a:fld>
             <a:endParaRPr lang="he-IL"/>
           </a:p>
@@ -10218,7 +10637,7 @@
           <a:p>
             <a:fld id="{774A27FE-EA11-4EDB-8F1F-B62C19952F4C}" type="datetimeFigureOut">
               <a:rPr lang="he-IL" smtClean="0"/>
-              <a:t>י"ב/סיון/תשפ"ה</a:t>
+              <a:t>י"ד/סיון/תשפ"ה</a:t>
             </a:fld>
             <a:endParaRPr lang="he-IL"/>
           </a:p>
@@ -10426,7 +10845,7 @@
           <a:p>
             <a:fld id="{774A27FE-EA11-4EDB-8F1F-B62C19952F4C}" type="datetimeFigureOut">
               <a:rPr lang="he-IL" smtClean="0"/>
-              <a:t>י"ב/סיון/תשפ"ה</a:t>
+              <a:t>י"ד/סיון/תשפ"ה</a:t>
             </a:fld>
             <a:endParaRPr lang="he-IL"/>
           </a:p>
@@ -10624,7 +11043,7 @@
           <a:p>
             <a:fld id="{774A27FE-EA11-4EDB-8F1F-B62C19952F4C}" type="datetimeFigureOut">
               <a:rPr lang="he-IL" smtClean="0"/>
-              <a:t>י"ב/סיון/תשפ"ה</a:t>
+              <a:t>י"ד/סיון/תשפ"ה</a:t>
             </a:fld>
             <a:endParaRPr lang="he-IL"/>
           </a:p>
@@ -10899,7 +11318,7 @@
           <a:p>
             <a:fld id="{774A27FE-EA11-4EDB-8F1F-B62C19952F4C}" type="datetimeFigureOut">
               <a:rPr lang="he-IL" smtClean="0"/>
-              <a:t>י"ב/סיון/תשפ"ה</a:t>
+              <a:t>י"ד/סיון/תשפ"ה</a:t>
             </a:fld>
             <a:endParaRPr lang="he-IL"/>
           </a:p>
@@ -11164,7 +11583,7 @@
           <a:p>
             <a:fld id="{774A27FE-EA11-4EDB-8F1F-B62C19952F4C}" type="datetimeFigureOut">
               <a:rPr lang="he-IL" smtClean="0"/>
-              <a:t>י"ב/סיון/תשפ"ה</a:t>
+              <a:t>י"ד/סיון/תשפ"ה</a:t>
             </a:fld>
             <a:endParaRPr lang="he-IL"/>
           </a:p>
@@ -11576,7 +11995,7 @@
           <a:p>
             <a:fld id="{774A27FE-EA11-4EDB-8F1F-B62C19952F4C}" type="datetimeFigureOut">
               <a:rPr lang="he-IL" smtClean="0"/>
-              <a:t>י"ב/סיון/תשפ"ה</a:t>
+              <a:t>י"ד/סיון/תשפ"ה</a:t>
             </a:fld>
             <a:endParaRPr lang="he-IL"/>
           </a:p>
@@ -11717,7 +12136,7 @@
           <a:p>
             <a:fld id="{774A27FE-EA11-4EDB-8F1F-B62C19952F4C}" type="datetimeFigureOut">
               <a:rPr lang="he-IL" smtClean="0"/>
-              <a:t>י"ב/סיון/תשפ"ה</a:t>
+              <a:t>י"ד/סיון/תשפ"ה</a:t>
             </a:fld>
             <a:endParaRPr lang="he-IL"/>
           </a:p>
@@ -11830,7 +12249,7 @@
           <a:p>
             <a:fld id="{774A27FE-EA11-4EDB-8F1F-B62C19952F4C}" type="datetimeFigureOut">
               <a:rPr lang="he-IL" smtClean="0"/>
-              <a:t>י"ב/סיון/תשפ"ה</a:t>
+              <a:t>י"ד/סיון/תשפ"ה</a:t>
             </a:fld>
             <a:endParaRPr lang="he-IL"/>
           </a:p>
@@ -12141,7 +12560,7 @@
           <a:p>
             <a:fld id="{774A27FE-EA11-4EDB-8F1F-B62C19952F4C}" type="datetimeFigureOut">
               <a:rPr lang="he-IL" smtClean="0"/>
-              <a:t>י"ב/סיון/תשפ"ה</a:t>
+              <a:t>י"ד/סיון/תשפ"ה</a:t>
             </a:fld>
             <a:endParaRPr lang="he-IL"/>
           </a:p>
@@ -12429,7 +12848,7 @@
           <a:p>
             <a:fld id="{774A27FE-EA11-4EDB-8F1F-B62C19952F4C}" type="datetimeFigureOut">
               <a:rPr lang="he-IL" smtClean="0"/>
-              <a:t>י"ב/סיון/תשפ"ה</a:t>
+              <a:t>י"ד/סיון/תשפ"ה</a:t>
             </a:fld>
             <a:endParaRPr lang="he-IL"/>
           </a:p>
@@ -12670,7 +13089,7 @@
           <a:p>
             <a:fld id="{774A27FE-EA11-4EDB-8F1F-B62C19952F4C}" type="datetimeFigureOut">
               <a:rPr lang="he-IL" smtClean="0"/>
-              <a:t>י"ב/סיון/תשפ"ה</a:t>
+              <a:t>י"ד/סיון/תשפ"ה</a:t>
             </a:fld>
             <a:endParaRPr lang="he-IL"/>
           </a:p>
@@ -13697,11 +14116,75 @@
               </a:rPr>
               <a:t>XGBoost</a:t>
             </a:r>
+            <a:endParaRPr lang="he-IL" dirty="0">
+              <a:latin typeface="Calibri" panose="020F0502020204030204" pitchFamily="34" charset="0"/>
+              <a:ea typeface="Calibri" panose="020F0502020204030204" pitchFamily="34" charset="0"/>
+              <a:cs typeface="Calibri" panose="020F0502020204030204" pitchFamily="34" charset="0"/>
+            </a:endParaRPr>
+          </a:p>
+          <a:p>
+            <a:pPr marL="0" indent="0">
+              <a:buNone/>
+            </a:pPr>
             <a:endParaRPr lang="en-US" dirty="0">
               <a:latin typeface="Calibri" panose="020F0502020204030204" pitchFamily="34" charset="0"/>
               <a:ea typeface="Calibri" panose="020F0502020204030204" pitchFamily="34" charset="0"/>
               <a:cs typeface="Calibri" panose="020F0502020204030204" pitchFamily="34" charset="0"/>
             </a:endParaRPr>
+          </a:p>
+          <a:p>
+            <a:pPr lvl="1"/>
+            <a:r>
+              <a:rPr lang="en-US" dirty="0" err="1">
+                <a:latin typeface="Calibri" panose="020F0502020204030204" pitchFamily="34" charset="0"/>
+                <a:ea typeface="Calibri" panose="020F0502020204030204" pitchFamily="34" charset="0"/>
+                <a:cs typeface="Calibri" panose="020F0502020204030204" pitchFamily="34" charset="0"/>
+              </a:rPr>
+              <a:t>BoW</a:t>
+            </a:r>
+            <a:endParaRPr lang="he-IL" dirty="0">
+              <a:latin typeface="Calibri" panose="020F0502020204030204" pitchFamily="34" charset="0"/>
+              <a:ea typeface="Calibri" panose="020F0502020204030204" pitchFamily="34" charset="0"/>
+              <a:cs typeface="Calibri" panose="020F0502020204030204" pitchFamily="34" charset="0"/>
+            </a:endParaRPr>
+          </a:p>
+          <a:p>
+            <a:pPr lvl="1"/>
+            <a:endParaRPr lang="en-US" sz="1600" dirty="0">
+              <a:latin typeface="Calibri" panose="020F0502020204030204" pitchFamily="34" charset="0"/>
+              <a:ea typeface="Calibri" panose="020F0502020204030204" pitchFamily="34" charset="0"/>
+              <a:cs typeface="Calibri" panose="020F0502020204030204" pitchFamily="34" charset="0"/>
+            </a:endParaRPr>
+          </a:p>
+          <a:p>
+            <a:pPr lvl="1"/>
+            <a:r>
+              <a:rPr lang="en-US" dirty="0">
+                <a:latin typeface="Calibri" panose="020F0502020204030204" pitchFamily="34" charset="0"/>
+                <a:ea typeface="Calibri" panose="020F0502020204030204" pitchFamily="34" charset="0"/>
+                <a:cs typeface="Calibri" panose="020F0502020204030204" pitchFamily="34" charset="0"/>
+              </a:rPr>
+              <a:t>TF-IDF</a:t>
+            </a:r>
+          </a:p>
+          <a:p>
+            <a:pPr lvl="1"/>
+            <a:endParaRPr lang="en-US" sz="1600" dirty="0">
+              <a:latin typeface="Calibri" panose="020F0502020204030204" pitchFamily="34" charset="0"/>
+              <a:ea typeface="Calibri" panose="020F0502020204030204" pitchFamily="34" charset="0"/>
+              <a:cs typeface="Calibri" panose="020F0502020204030204" pitchFamily="34" charset="0"/>
+            </a:endParaRPr>
+          </a:p>
+          <a:p>
+            <a:pPr lvl="1"/>
+            <a:r>
+              <a:rPr lang="en-US" dirty="0">
+                <a:latin typeface="Calibri" panose="020F0502020204030204" pitchFamily="34" charset="0"/>
+                <a:ea typeface="Calibri" panose="020F0502020204030204" pitchFamily="34" charset="0"/>
+                <a:cs typeface="Calibri" panose="020F0502020204030204" pitchFamily="34" charset="0"/>
+              </a:rPr>
+              <a:t>Embedding</a:t>
+            </a:r>
           </a:p>
           <a:p>
             <a:endParaRPr lang="en-US" dirty="0">
@@ -14301,6 +14784,36 @@
           </a:p>
         </p:txBody>
       </p:sp>
+      <p:pic>
+        <p:nvPicPr>
+          <p:cNvPr id="5" name="תמונה 4">
+            <a:extLst>
+              <a:ext uri="{FF2B5EF4-FFF2-40B4-BE49-F238E27FC236}">
+                <a16:creationId xmlns:a16="http://schemas.microsoft.com/office/drawing/2014/main" id="{1860A778-C7F8-E2EC-04D7-2B9FC4B694E7}"/>
+              </a:ext>
+            </a:extLst>
+          </p:cNvPr>
+          <p:cNvPicPr>
+            <a:picLocks noChangeAspect="1"/>
+          </p:cNvPicPr>
+          <p:nvPr/>
+        </p:nvPicPr>
+        <p:blipFill>
+          <a:blip r:embed="rId3"/>
+          <a:stretch>
+            <a:fillRect/>
+          </a:stretch>
+        </p:blipFill>
+        <p:spPr>
+          <a:xfrm>
+            <a:off x="419100" y="2618080"/>
+            <a:ext cx="11353800" cy="3874795"/>
+          </a:xfrm>
+          <a:prstGeom prst="rect">
+            <a:avLst/>
+          </a:prstGeom>
+        </p:spPr>
+      </p:pic>
     </p:spTree>
     <p:extLst>
       <p:ext uri="{BB962C8B-B14F-4D97-AF65-F5344CB8AC3E}">

</xml_diff>